<commit_message>
Significant edits to the VIOD manuscript.
New figures to prove VIOD error can be predicted by hodograph radius error; updated verification figures with no markers for the error model line; minor updates to RROD code.
</commit_message>
<xml_diff>
--- a/journal/figures/myFigures.pptx
+++ b/journal/figures/myFigures.pptx
@@ -262,7 +262,7 @@
           <a:p>
             <a:fld id="{2CEF6C36-5691-4952-B197-D88666D142D8}" type="datetimeFigureOut">
               <a:rPr lang="en-US" smtClean="0"/>
-              <a:t>10/26/2020</a:t>
+              <a:t>10/27/2020</a:t>
             </a:fld>
             <a:endParaRPr lang="en-US"/>
           </a:p>
@@ -460,7 +460,7 @@
           <a:p>
             <a:fld id="{2CEF6C36-5691-4952-B197-D88666D142D8}" type="datetimeFigureOut">
               <a:rPr lang="en-US" smtClean="0"/>
-              <a:t>10/26/2020</a:t>
+              <a:t>10/27/2020</a:t>
             </a:fld>
             <a:endParaRPr lang="en-US"/>
           </a:p>
@@ -668,7 +668,7 @@
           <a:p>
             <a:fld id="{2CEF6C36-5691-4952-B197-D88666D142D8}" type="datetimeFigureOut">
               <a:rPr lang="en-US" smtClean="0"/>
-              <a:t>10/26/2020</a:t>
+              <a:t>10/27/2020</a:t>
             </a:fld>
             <a:endParaRPr lang="en-US"/>
           </a:p>
@@ -866,7 +866,7 @@
           <a:p>
             <a:fld id="{2CEF6C36-5691-4952-B197-D88666D142D8}" type="datetimeFigureOut">
               <a:rPr lang="en-US" smtClean="0"/>
-              <a:t>10/26/2020</a:t>
+              <a:t>10/27/2020</a:t>
             </a:fld>
             <a:endParaRPr lang="en-US"/>
           </a:p>
@@ -1141,7 +1141,7 @@
           <a:p>
             <a:fld id="{2CEF6C36-5691-4952-B197-D88666D142D8}" type="datetimeFigureOut">
               <a:rPr lang="en-US" smtClean="0"/>
-              <a:t>10/26/2020</a:t>
+              <a:t>10/27/2020</a:t>
             </a:fld>
             <a:endParaRPr lang="en-US"/>
           </a:p>
@@ -1406,7 +1406,7 @@
           <a:p>
             <a:fld id="{2CEF6C36-5691-4952-B197-D88666D142D8}" type="datetimeFigureOut">
               <a:rPr lang="en-US" smtClean="0"/>
-              <a:t>10/26/2020</a:t>
+              <a:t>10/27/2020</a:t>
             </a:fld>
             <a:endParaRPr lang="en-US"/>
           </a:p>
@@ -1818,7 +1818,7 @@
           <a:p>
             <a:fld id="{2CEF6C36-5691-4952-B197-D88666D142D8}" type="datetimeFigureOut">
               <a:rPr lang="en-US" smtClean="0"/>
-              <a:t>10/26/2020</a:t>
+              <a:t>10/27/2020</a:t>
             </a:fld>
             <a:endParaRPr lang="en-US"/>
           </a:p>
@@ -1959,7 +1959,7 @@
           <a:p>
             <a:fld id="{2CEF6C36-5691-4952-B197-D88666D142D8}" type="datetimeFigureOut">
               <a:rPr lang="en-US" smtClean="0"/>
-              <a:t>10/26/2020</a:t>
+              <a:t>10/27/2020</a:t>
             </a:fld>
             <a:endParaRPr lang="en-US"/>
           </a:p>
@@ -2072,7 +2072,7 @@
           <a:p>
             <a:fld id="{2CEF6C36-5691-4952-B197-D88666D142D8}" type="datetimeFigureOut">
               <a:rPr lang="en-US" smtClean="0"/>
-              <a:t>10/26/2020</a:t>
+              <a:t>10/27/2020</a:t>
             </a:fld>
             <a:endParaRPr lang="en-US"/>
           </a:p>
@@ -2383,7 +2383,7 @@
           <a:p>
             <a:fld id="{2CEF6C36-5691-4952-B197-D88666D142D8}" type="datetimeFigureOut">
               <a:rPr lang="en-US" smtClean="0"/>
-              <a:t>10/26/2020</a:t>
+              <a:t>10/27/2020</a:t>
             </a:fld>
             <a:endParaRPr lang="en-US"/>
           </a:p>
@@ -2671,7 +2671,7 @@
           <a:p>
             <a:fld id="{2CEF6C36-5691-4952-B197-D88666D142D8}" type="datetimeFigureOut">
               <a:rPr lang="en-US" smtClean="0"/>
-              <a:t>10/26/2020</a:t>
+              <a:t>10/27/2020</a:t>
             </a:fld>
             <a:endParaRPr lang="en-US"/>
           </a:p>
@@ -2912,7 +2912,7 @@
           <a:p>
             <a:fld id="{2CEF6C36-5691-4952-B197-D88666D142D8}" type="datetimeFigureOut">
               <a:rPr lang="en-US" smtClean="0"/>
-              <a:t>10/26/2020</a:t>
+              <a:t>10/27/2020</a:t>
             </a:fld>
             <a:endParaRPr lang="en-US"/>
           </a:p>
@@ -4833,123 +4833,6 @@
       </p:cxnSp>
       <p:sp>
         <p:nvSpPr>
-          <p:cNvPr id="66" name="TextBox 65">
-            <a:extLst>
-              <a:ext uri="{FF2B5EF4-FFF2-40B4-BE49-F238E27FC236}">
-                <a16:creationId xmlns:a16="http://schemas.microsoft.com/office/drawing/2014/main" id="{8AA9BEB7-6CF4-48B0-A122-F99C2886E9C9}"/>
-              </a:ext>
-            </a:extLst>
-          </p:cNvPr>
-          <p:cNvSpPr txBox="1"/>
-          <p:nvPr/>
-        </p:nvSpPr>
-        <p:spPr>
-          <a:xfrm rot="19800000">
-            <a:off x="66094" y="3476117"/>
-            <a:ext cx="2014432" cy="461665"/>
-          </a:xfrm>
-          <a:prstGeom prst="rect">
-            <a:avLst/>
-          </a:prstGeom>
-          <a:noFill/>
-        </p:spPr>
-        <p:txBody>
-          <a:bodyPr wrap="square" rtlCol="0">
-            <a:spAutoFit/>
-          </a:bodyPr>
-          <a:lstStyle/>
-          <a:p>
-            <a:pPr algn="ctr"/>
-            <a:r>
-              <a:rPr lang="en-US" sz="2400" dirty="0">
-                <a:latin typeface="Times New Roman" panose="02020603050405020304" pitchFamily="18" charset="0"/>
-                <a:cs typeface="Times New Roman" panose="02020603050405020304" pitchFamily="18" charset="0"/>
-              </a:rPr>
-              <a:t>e = 0.1</a:t>
-            </a:r>
-          </a:p>
-        </p:txBody>
-      </p:sp>
-      <p:sp>
-        <p:nvSpPr>
-          <p:cNvPr id="68" name="TextBox 67">
-            <a:extLst>
-              <a:ext uri="{FF2B5EF4-FFF2-40B4-BE49-F238E27FC236}">
-                <a16:creationId xmlns:a16="http://schemas.microsoft.com/office/drawing/2014/main" id="{8C61E530-0F2A-4665-B73F-C0E1AF7EC060}"/>
-              </a:ext>
-            </a:extLst>
-          </p:cNvPr>
-          <p:cNvSpPr txBox="1"/>
-          <p:nvPr/>
-        </p:nvSpPr>
-        <p:spPr>
-          <a:xfrm rot="19800000">
-            <a:off x="4094665" y="3478877"/>
-            <a:ext cx="2014432" cy="461665"/>
-          </a:xfrm>
-          <a:prstGeom prst="rect">
-            <a:avLst/>
-          </a:prstGeom>
-          <a:noFill/>
-        </p:spPr>
-        <p:txBody>
-          <a:bodyPr wrap="square" rtlCol="0">
-            <a:spAutoFit/>
-          </a:bodyPr>
-          <a:lstStyle/>
-          <a:p>
-            <a:pPr algn="ctr"/>
-            <a:r>
-              <a:rPr lang="en-US" sz="2400" dirty="0">
-                <a:latin typeface="Times New Roman" panose="02020603050405020304" pitchFamily="18" charset="0"/>
-                <a:cs typeface="Times New Roman" panose="02020603050405020304" pitchFamily="18" charset="0"/>
-              </a:rPr>
-              <a:t>e = 0.5</a:t>
-            </a:r>
-          </a:p>
-        </p:txBody>
-      </p:sp>
-      <p:sp>
-        <p:nvSpPr>
-          <p:cNvPr id="70" name="TextBox 69">
-            <a:extLst>
-              <a:ext uri="{FF2B5EF4-FFF2-40B4-BE49-F238E27FC236}">
-                <a16:creationId xmlns:a16="http://schemas.microsoft.com/office/drawing/2014/main" id="{0E5170D4-BA08-4E3E-A3BA-A4DDA74A1AA3}"/>
-              </a:ext>
-            </a:extLst>
-          </p:cNvPr>
-          <p:cNvSpPr txBox="1"/>
-          <p:nvPr/>
-        </p:nvSpPr>
-        <p:spPr>
-          <a:xfrm rot="19800000">
-            <a:off x="7822272" y="3474468"/>
-            <a:ext cx="2014432" cy="461665"/>
-          </a:xfrm>
-          <a:prstGeom prst="rect">
-            <a:avLst/>
-          </a:prstGeom>
-          <a:noFill/>
-        </p:spPr>
-        <p:txBody>
-          <a:bodyPr wrap="square" rtlCol="0">
-            <a:spAutoFit/>
-          </a:bodyPr>
-          <a:lstStyle/>
-          <a:p>
-            <a:pPr algn="ctr"/>
-            <a:r>
-              <a:rPr lang="en-US" sz="2400" dirty="0">
-                <a:latin typeface="Times New Roman" panose="02020603050405020304" pitchFamily="18" charset="0"/>
-                <a:cs typeface="Times New Roman" panose="02020603050405020304" pitchFamily="18" charset="0"/>
-              </a:rPr>
-              <a:t>e = 0.9</a:t>
-            </a:r>
-          </a:p>
-        </p:txBody>
-      </p:sp>
-      <p:sp>
-        <p:nvSpPr>
           <p:cNvPr id="74" name="Arc 73">
             <a:extLst>
               <a:ext uri="{FF2B5EF4-FFF2-40B4-BE49-F238E27FC236}">
@@ -5933,123 +5816,6 @@
               <a:latin typeface="Times New Roman" panose="02020603050405020304" pitchFamily="18" charset="0"/>
               <a:cs typeface="Times New Roman" panose="02020603050405020304" pitchFamily="18" charset="0"/>
             </a:endParaRPr>
-          </a:p>
-        </p:txBody>
-      </p:sp>
-      <p:sp>
-        <p:nvSpPr>
-          <p:cNvPr id="3" name="TextBox 2">
-            <a:extLst>
-              <a:ext uri="{FF2B5EF4-FFF2-40B4-BE49-F238E27FC236}">
-                <a16:creationId xmlns:a16="http://schemas.microsoft.com/office/drawing/2014/main" id="{6321807C-0050-4760-AE07-5599ED01D23E}"/>
-              </a:ext>
-            </a:extLst>
-          </p:cNvPr>
-          <p:cNvSpPr txBox="1"/>
-          <p:nvPr/>
-        </p:nvSpPr>
-        <p:spPr>
-          <a:xfrm>
-            <a:off x="1389425" y="1461281"/>
-            <a:ext cx="1018547" cy="338554"/>
-          </a:xfrm>
-          <a:prstGeom prst="rect">
-            <a:avLst/>
-          </a:prstGeom>
-          <a:noFill/>
-        </p:spPr>
-        <p:txBody>
-          <a:bodyPr wrap="square" rtlCol="0">
-            <a:spAutoFit/>
-          </a:bodyPr>
-          <a:lstStyle/>
-          <a:p>
-            <a:pPr algn="ctr"/>
-            <a:r>
-              <a:rPr lang="en-US" sz="1600" dirty="0">
-                <a:latin typeface="Times New Roman" panose="02020603050405020304" pitchFamily="18" charset="0"/>
-                <a:cs typeface="Times New Roman" panose="02020603050405020304" pitchFamily="18" charset="0"/>
-              </a:rPr>
-              <a:t>CB</a:t>
-            </a:r>
-          </a:p>
-        </p:txBody>
-      </p:sp>
-      <p:sp>
-        <p:nvSpPr>
-          <p:cNvPr id="72" name="TextBox 71">
-            <a:extLst>
-              <a:ext uri="{FF2B5EF4-FFF2-40B4-BE49-F238E27FC236}">
-                <a16:creationId xmlns:a16="http://schemas.microsoft.com/office/drawing/2014/main" id="{8E02906A-3DBD-490F-9867-6EF6E8929B2D}"/>
-              </a:ext>
-            </a:extLst>
-          </p:cNvPr>
-          <p:cNvSpPr txBox="1"/>
-          <p:nvPr/>
-        </p:nvSpPr>
-        <p:spPr>
-          <a:xfrm>
-            <a:off x="5373769" y="1997587"/>
-            <a:ext cx="1018547" cy="338554"/>
-          </a:xfrm>
-          <a:prstGeom prst="rect">
-            <a:avLst/>
-          </a:prstGeom>
-          <a:noFill/>
-        </p:spPr>
-        <p:txBody>
-          <a:bodyPr wrap="square" rtlCol="0">
-            <a:spAutoFit/>
-          </a:bodyPr>
-          <a:lstStyle/>
-          <a:p>
-            <a:pPr algn="ctr"/>
-            <a:r>
-              <a:rPr lang="en-US" sz="1600" dirty="0">
-                <a:latin typeface="Times New Roman" panose="02020603050405020304" pitchFamily="18" charset="0"/>
-                <a:cs typeface="Times New Roman" panose="02020603050405020304" pitchFamily="18" charset="0"/>
-              </a:rPr>
-              <a:t>CB</a:t>
-            </a:r>
-          </a:p>
-        </p:txBody>
-      </p:sp>
-      <p:sp>
-        <p:nvSpPr>
-          <p:cNvPr id="76" name="TextBox 75">
-            <a:extLst>
-              <a:ext uri="{FF2B5EF4-FFF2-40B4-BE49-F238E27FC236}">
-                <a16:creationId xmlns:a16="http://schemas.microsoft.com/office/drawing/2014/main" id="{6A0914C8-4790-4BE0-A24D-06BFC865F670}"/>
-              </a:ext>
-            </a:extLst>
-          </p:cNvPr>
-          <p:cNvSpPr txBox="1"/>
-          <p:nvPr/>
-        </p:nvSpPr>
-        <p:spPr>
-          <a:xfrm>
-            <a:off x="8933875" y="2571663"/>
-            <a:ext cx="1018547" cy="338554"/>
-          </a:xfrm>
-          <a:prstGeom prst="rect">
-            <a:avLst/>
-          </a:prstGeom>
-          <a:noFill/>
-        </p:spPr>
-        <p:txBody>
-          <a:bodyPr wrap="square" rtlCol="0">
-            <a:spAutoFit/>
-          </a:bodyPr>
-          <a:lstStyle/>
-          <a:p>
-            <a:pPr algn="ctr"/>
-            <a:r>
-              <a:rPr lang="en-US" sz="1600" dirty="0">
-                <a:latin typeface="Times New Roman" panose="02020603050405020304" pitchFamily="18" charset="0"/>
-                <a:cs typeface="Times New Roman" panose="02020603050405020304" pitchFamily="18" charset="0"/>
-              </a:rPr>
-              <a:t>CB</a:t>
-            </a:r>
           </a:p>
         </p:txBody>
       </p:sp>
@@ -7493,47 +7259,6 @@
           </a:fontRef>
         </p:style>
       </p:cxnSp>
-      <p:cxnSp>
-        <p:nvCxnSpPr>
-          <p:cNvPr id="3" name="Straight Connector 2">
-            <a:extLst>
-              <a:ext uri="{FF2B5EF4-FFF2-40B4-BE49-F238E27FC236}">
-                <a16:creationId xmlns:a16="http://schemas.microsoft.com/office/drawing/2014/main" id="{08A28400-A180-44B9-B7BA-F5DFA0C388F2}"/>
-              </a:ext>
-            </a:extLst>
-          </p:cNvPr>
-          <p:cNvCxnSpPr/>
-          <p:nvPr/>
-        </p:nvCxnSpPr>
-        <p:spPr>
-          <a:xfrm>
-            <a:off x="6096000" y="1143000"/>
-            <a:ext cx="0" cy="4572000"/>
-          </a:xfrm>
-          <a:prstGeom prst="line">
-            <a:avLst/>
-          </a:prstGeom>
-          <a:ln w="28575">
-            <a:solidFill>
-              <a:schemeClr val="tx1"/>
-            </a:solidFill>
-          </a:ln>
-        </p:spPr>
-        <p:style>
-          <a:lnRef idx="1">
-            <a:schemeClr val="accent1"/>
-          </a:lnRef>
-          <a:fillRef idx="0">
-            <a:schemeClr val="accent1"/>
-          </a:fillRef>
-          <a:effectRef idx="0">
-            <a:schemeClr val="accent1"/>
-          </a:effectRef>
-          <a:fontRef idx="minor">
-            <a:schemeClr val="tx1"/>
-          </a:fontRef>
-        </p:style>
-      </p:cxnSp>
       <p:sp>
         <p:nvSpPr>
           <p:cNvPr id="27" name="TextBox 26">
@@ -9408,8 +9133,8 @@
         </p:nvSpPr>
         <p:spPr>
           <a:xfrm>
-            <a:off x="3464603" y="3458264"/>
-            <a:ext cx="1018547" cy="338554"/>
+            <a:off x="2807971" y="3458264"/>
+            <a:ext cx="1365418" cy="338554"/>
           </a:xfrm>
           <a:prstGeom prst="rect">
             <a:avLst/>
@@ -9428,7 +9153,7 @@
                 <a:latin typeface="Times New Roman" panose="02020603050405020304" pitchFamily="18" charset="0"/>
                 <a:cs typeface="Times New Roman" panose="02020603050405020304" pitchFamily="18" charset="0"/>
               </a:rPr>
-              <a:t>CB</a:t>
+              <a:t>Central Body</a:t>
             </a:r>
           </a:p>
         </p:txBody>
@@ -10267,6 +9992,45 @@
               <a:latin typeface="Times New Roman" panose="02020603050405020304" pitchFamily="18" charset="0"/>
               <a:cs typeface="Times New Roman" panose="02020603050405020304" pitchFamily="18" charset="0"/>
             </a:endParaRPr>
+          </a:p>
+        </p:txBody>
+      </p:sp>
+      <p:sp>
+        <p:nvSpPr>
+          <p:cNvPr id="44" name="TextBox 43">
+            <a:extLst>
+              <a:ext uri="{FF2B5EF4-FFF2-40B4-BE49-F238E27FC236}">
+                <a16:creationId xmlns:a16="http://schemas.microsoft.com/office/drawing/2014/main" id="{D6A2D97B-16B3-4C18-AE07-AE8EA76FC639}"/>
+              </a:ext>
+            </a:extLst>
+          </p:cNvPr>
+          <p:cNvSpPr txBox="1"/>
+          <p:nvPr/>
+        </p:nvSpPr>
+        <p:spPr>
+          <a:xfrm>
+            <a:off x="7855995" y="3856552"/>
+            <a:ext cx="387366" cy="338554"/>
+          </a:xfrm>
+          <a:prstGeom prst="rect">
+            <a:avLst/>
+          </a:prstGeom>
+          <a:noFill/>
+        </p:spPr>
+        <p:txBody>
+          <a:bodyPr wrap="square" rtlCol="0">
+            <a:spAutoFit/>
+          </a:bodyPr>
+          <a:lstStyle/>
+          <a:p>
+            <a:pPr algn="ctr"/>
+            <a:r>
+              <a:rPr lang="en-US" sz="1600" dirty="0">
+                <a:latin typeface="Times New Roman" panose="02020603050405020304" pitchFamily="18" charset="0"/>
+                <a:cs typeface="Times New Roman" panose="02020603050405020304" pitchFamily="18" charset="0"/>
+              </a:rPr>
+              <a:t>O</a:t>
+            </a:r>
           </a:p>
         </p:txBody>
       </p:sp>
@@ -10696,8 +10460,8 @@
           </a:fontRef>
         </p:style>
       </p:cxnSp>
-      <mc:AlternateContent xmlns:mc="http://schemas.openxmlformats.org/markup-compatibility/2006">
-        <mc:Choice xmlns:a14="http://schemas.microsoft.com/office/drawing/2010/main" Requires="a14">
+      <mc:AlternateContent xmlns:mc="http://schemas.openxmlformats.org/markup-compatibility/2006" xmlns:a14="http://schemas.microsoft.com/office/drawing/2010/main">
+        <mc:Choice Requires="a14">
           <p:sp>
             <p:nvSpPr>
               <p:cNvPr id="20" name="TextBox 19">
@@ -10726,6 +10490,7 @@
               </a:bodyPr>
               <a:lstStyle/>
               <a:p>
+                <a:pPr/>
                 <a14:m>
                   <m:oMathPara xmlns:m="http://schemas.openxmlformats.org/officeDocument/2006/math">
                     <m:oMathParaPr>
@@ -10736,7 +10501,7 @@
                         <m:accPr>
                           <m:chr m:val="̂"/>
                           <m:ctrlPr>
-                            <a:rPr lang="en-US" sz="2000" b="1" smtClean="0">
+                            <a:rPr lang="en-US" sz="2000" b="1" i="1" smtClean="0">
                               <a:latin typeface="Cambria Math" panose="02040503050406030204" pitchFamily="18" charset="0"/>
                             </a:rPr>
                           </m:ctrlPr>
@@ -10758,7 +10523,7 @@
             </p:txBody>
           </p:sp>
         </mc:Choice>
-        <mc:Fallback>
+        <mc:Fallback xmlns="">
           <p:sp>
             <p:nvSpPr>
               <p:cNvPr id="20" name="TextBox 19">
@@ -10803,8 +10568,8 @@
           </p:sp>
         </mc:Fallback>
       </mc:AlternateContent>
-      <mc:AlternateContent xmlns:mc="http://schemas.openxmlformats.org/markup-compatibility/2006">
-        <mc:Choice xmlns:a14="http://schemas.microsoft.com/office/drawing/2010/main" Requires="a14">
+      <mc:AlternateContent xmlns:mc="http://schemas.openxmlformats.org/markup-compatibility/2006" xmlns:a14="http://schemas.microsoft.com/office/drawing/2010/main">
+        <mc:Choice Requires="a14">
           <p:sp>
             <p:nvSpPr>
               <p:cNvPr id="21" name="TextBox 20">
@@ -10833,6 +10598,7 @@
               </a:bodyPr>
               <a:lstStyle/>
               <a:p>
+                <a:pPr/>
                 <a14:m>
                   <m:oMathPara xmlns:m="http://schemas.openxmlformats.org/officeDocument/2006/math">
                     <m:oMathParaPr>
@@ -10843,7 +10609,7 @@
                         <m:accPr>
                           <m:chr m:val="̂"/>
                           <m:ctrlPr>
-                            <a:rPr lang="en-US" sz="2000" b="1" smtClean="0">
+                            <a:rPr lang="en-US" sz="2000" b="1" i="1" smtClean="0">
                               <a:latin typeface="Cambria Math" panose="02040503050406030204" pitchFamily="18" charset="0"/>
                             </a:rPr>
                           </m:ctrlPr>
@@ -10865,7 +10631,7 @@
             </p:txBody>
           </p:sp>
         </mc:Choice>
-        <mc:Fallback>
+        <mc:Fallback xmlns="">
           <p:sp>
             <p:nvSpPr>
               <p:cNvPr id="21" name="TextBox 20">
@@ -10910,8 +10676,8 @@
           </p:sp>
         </mc:Fallback>
       </mc:AlternateContent>
-      <mc:AlternateContent xmlns:mc="http://schemas.openxmlformats.org/markup-compatibility/2006">
-        <mc:Choice xmlns:a14="http://schemas.microsoft.com/office/drawing/2010/main" Requires="a14">
+      <mc:AlternateContent xmlns:mc="http://schemas.openxmlformats.org/markup-compatibility/2006" xmlns:a14="http://schemas.microsoft.com/office/drawing/2010/main">
+        <mc:Choice Requires="a14">
           <p:sp>
             <p:nvSpPr>
               <p:cNvPr id="22" name="TextBox 21">
@@ -10940,6 +10706,7 @@
               </a:bodyPr>
               <a:lstStyle/>
               <a:p>
+                <a:pPr/>
                 <a14:m>
                   <m:oMathPara xmlns:m="http://schemas.openxmlformats.org/officeDocument/2006/math">
                     <m:oMathParaPr>
@@ -10950,7 +10717,7 @@
                         <m:accPr>
                           <m:chr m:val="̂"/>
                           <m:ctrlPr>
-                            <a:rPr lang="en-US" sz="2000" b="1" smtClean="0">
+                            <a:rPr lang="en-US" sz="2000" b="1" i="1" smtClean="0">
                               <a:latin typeface="Cambria Math" panose="02040503050406030204" pitchFamily="18" charset="0"/>
                             </a:rPr>
                           </m:ctrlPr>
@@ -10972,7 +10739,7 @@
             </p:txBody>
           </p:sp>
         </mc:Choice>
-        <mc:Fallback>
+        <mc:Fallback xmlns="">
           <p:sp>
             <p:nvSpPr>
               <p:cNvPr id="22" name="TextBox 21">
@@ -11546,8 +11313,8 @@
           </a:fontRef>
         </p:style>
       </p:cxnSp>
-      <mc:AlternateContent xmlns:mc="http://schemas.openxmlformats.org/markup-compatibility/2006">
-        <mc:Choice xmlns:a14="http://schemas.microsoft.com/office/drawing/2010/main" Requires="a14">
+      <mc:AlternateContent xmlns:mc="http://schemas.openxmlformats.org/markup-compatibility/2006" xmlns:a14="http://schemas.microsoft.com/office/drawing/2010/main">
+        <mc:Choice Requires="a14">
           <p:sp>
             <p:nvSpPr>
               <p:cNvPr id="66" name="TextBox 65">
@@ -11576,6 +11343,7 @@
               </a:bodyPr>
               <a:lstStyle/>
               <a:p>
+                <a:pPr/>
                 <a14:m>
                   <m:oMathPara xmlns:m="http://schemas.openxmlformats.org/officeDocument/2006/math">
                     <m:oMathParaPr>
@@ -11596,7 +11364,7 @@
             </p:txBody>
           </p:sp>
         </mc:Choice>
-        <mc:Fallback>
+        <mc:Fallback xmlns="">
           <p:sp>
             <p:nvSpPr>
               <p:cNvPr id="66" name="TextBox 65">
@@ -11641,8 +11409,8 @@
           </p:sp>
         </mc:Fallback>
       </mc:AlternateContent>
-      <mc:AlternateContent xmlns:mc="http://schemas.openxmlformats.org/markup-compatibility/2006">
-        <mc:Choice xmlns:a14="http://schemas.microsoft.com/office/drawing/2010/main" Requires="a14">
+      <mc:AlternateContent xmlns:mc="http://schemas.openxmlformats.org/markup-compatibility/2006" xmlns:a14="http://schemas.microsoft.com/office/drawing/2010/main">
+        <mc:Choice Requires="a14">
           <p:sp>
             <p:nvSpPr>
               <p:cNvPr id="67" name="TextBox 66">
@@ -11671,6 +11439,7 @@
               </a:bodyPr>
               <a:lstStyle/>
               <a:p>
+                <a:pPr/>
                 <a14:m>
                   <m:oMathPara xmlns:m="http://schemas.openxmlformats.org/officeDocument/2006/math">
                     <m:oMathParaPr>
@@ -11691,7 +11460,7 @@
             </p:txBody>
           </p:sp>
         </mc:Choice>
-        <mc:Fallback>
+        <mc:Fallback xmlns="">
           <p:sp>
             <p:nvSpPr>
               <p:cNvPr id="67" name="TextBox 66">
@@ -11736,8 +11505,8 @@
           </p:sp>
         </mc:Fallback>
       </mc:AlternateContent>
-      <mc:AlternateContent xmlns:mc="http://schemas.openxmlformats.org/markup-compatibility/2006">
-        <mc:Choice xmlns:a14="http://schemas.microsoft.com/office/drawing/2010/main" Requires="a14">
+      <mc:AlternateContent xmlns:mc="http://schemas.openxmlformats.org/markup-compatibility/2006" xmlns:a14="http://schemas.microsoft.com/office/drawing/2010/main">
+        <mc:Choice Requires="a14">
           <p:sp>
             <p:nvSpPr>
               <p:cNvPr id="68" name="TextBox 67">
@@ -11766,6 +11535,7 @@
               </a:bodyPr>
               <a:lstStyle/>
               <a:p>
+                <a:pPr/>
                 <a14:m>
                   <m:oMathPara xmlns:m="http://schemas.openxmlformats.org/officeDocument/2006/math">
                     <m:oMathParaPr>
@@ -11789,7 +11559,7 @@
             </p:txBody>
           </p:sp>
         </mc:Choice>
-        <mc:Fallback>
+        <mc:Fallback xmlns="">
           <p:sp>
             <p:nvSpPr>
               <p:cNvPr id="68" name="TextBox 67">
@@ -11834,8 +11604,8 @@
           </p:sp>
         </mc:Fallback>
       </mc:AlternateContent>
-      <mc:AlternateContent xmlns:mc="http://schemas.openxmlformats.org/markup-compatibility/2006">
-        <mc:Choice xmlns:a14="http://schemas.microsoft.com/office/drawing/2010/main" Requires="a14">
+      <mc:AlternateContent xmlns:mc="http://schemas.openxmlformats.org/markup-compatibility/2006" xmlns:a14="http://schemas.microsoft.com/office/drawing/2010/main">
+        <mc:Choice Requires="a14">
           <p:sp>
             <p:nvSpPr>
               <p:cNvPr id="69" name="TextBox 68">
@@ -11864,6 +11634,7 @@
               </a:bodyPr>
               <a:lstStyle/>
               <a:p>
+                <a:pPr/>
                 <a14:m>
                   <m:oMathPara xmlns:m="http://schemas.openxmlformats.org/officeDocument/2006/math">
                     <m:oMathParaPr>
@@ -11887,7 +11658,7 @@
             </p:txBody>
           </p:sp>
         </mc:Choice>
-        <mc:Fallback>
+        <mc:Fallback xmlns="">
           <p:sp>
             <p:nvSpPr>
               <p:cNvPr id="69" name="TextBox 68">
@@ -11932,8 +11703,8 @@
           </p:sp>
         </mc:Fallback>
       </mc:AlternateContent>
-      <mc:AlternateContent xmlns:mc="http://schemas.openxmlformats.org/markup-compatibility/2006">
-        <mc:Choice xmlns:a14="http://schemas.microsoft.com/office/drawing/2010/main" Requires="a14">
+      <mc:AlternateContent xmlns:mc="http://schemas.openxmlformats.org/markup-compatibility/2006" xmlns:a14="http://schemas.microsoft.com/office/drawing/2010/main">
+        <mc:Choice Requires="a14">
           <p:sp>
             <p:nvSpPr>
               <p:cNvPr id="70" name="TextBox 69">
@@ -11962,6 +11733,7 @@
               </a:bodyPr>
               <a:lstStyle/>
               <a:p>
+                <a:pPr/>
                 <a14:m>
                   <m:oMathPara xmlns:m="http://schemas.openxmlformats.org/officeDocument/2006/math">
                     <m:oMathParaPr>
@@ -11982,7 +11754,7 @@
             </p:txBody>
           </p:sp>
         </mc:Choice>
-        <mc:Fallback>
+        <mc:Fallback xmlns="">
           <p:sp>
             <p:nvSpPr>
               <p:cNvPr id="70" name="TextBox 69">
@@ -12027,8 +11799,8 @@
           </p:sp>
         </mc:Fallback>
       </mc:AlternateContent>
-      <mc:AlternateContent xmlns:mc="http://schemas.openxmlformats.org/markup-compatibility/2006">
-        <mc:Choice xmlns:a14="http://schemas.microsoft.com/office/drawing/2010/main" Requires="a14">
+      <mc:AlternateContent xmlns:mc="http://schemas.openxmlformats.org/markup-compatibility/2006" xmlns:a14="http://schemas.microsoft.com/office/drawing/2010/main">
+        <mc:Choice Requires="a14">
           <p:sp>
             <p:nvSpPr>
               <p:cNvPr id="71" name="TextBox 70">
@@ -12057,6 +11829,7 @@
               </a:bodyPr>
               <a:lstStyle/>
               <a:p>
+                <a:pPr/>
                 <a14:m>
                   <m:oMathPara xmlns:m="http://schemas.openxmlformats.org/officeDocument/2006/math">
                     <m:oMathParaPr>
@@ -12077,7 +11850,7 @@
             </p:txBody>
           </p:sp>
         </mc:Choice>
-        <mc:Fallback>
+        <mc:Fallback xmlns="">
           <p:sp>
             <p:nvSpPr>
               <p:cNvPr id="71" name="TextBox 70">
@@ -12122,8 +11895,8 @@
           </p:sp>
         </mc:Fallback>
       </mc:AlternateContent>
-      <mc:AlternateContent xmlns:mc="http://schemas.openxmlformats.org/markup-compatibility/2006">
-        <mc:Choice xmlns:a14="http://schemas.microsoft.com/office/drawing/2010/main" Requires="a14">
+      <mc:AlternateContent xmlns:mc="http://schemas.openxmlformats.org/markup-compatibility/2006" xmlns:a14="http://schemas.microsoft.com/office/drawing/2010/main">
+        <mc:Choice Requires="a14">
           <p:sp>
             <p:nvSpPr>
               <p:cNvPr id="72" name="TextBox 71">
@@ -12152,6 +11925,7 @@
               </a:bodyPr>
               <a:lstStyle/>
               <a:p>
+                <a:pPr/>
                 <a14:m>
                   <m:oMathPara xmlns:m="http://schemas.openxmlformats.org/officeDocument/2006/math">
                     <m:oMathParaPr>
@@ -12172,7 +11946,7 @@
             </p:txBody>
           </p:sp>
         </mc:Choice>
-        <mc:Fallback>
+        <mc:Fallback xmlns="">
           <p:sp>
             <p:nvSpPr>
               <p:cNvPr id="72" name="TextBox 71">
@@ -12217,8 +11991,8 @@
           </p:sp>
         </mc:Fallback>
       </mc:AlternateContent>
-      <mc:AlternateContent xmlns:mc="http://schemas.openxmlformats.org/markup-compatibility/2006">
-        <mc:Choice xmlns:a14="http://schemas.microsoft.com/office/drawing/2010/main" Requires="a14">
+      <mc:AlternateContent xmlns:mc="http://schemas.openxmlformats.org/markup-compatibility/2006" xmlns:a14="http://schemas.microsoft.com/office/drawing/2010/main">
+        <mc:Choice Requires="a14">
           <p:sp>
             <p:nvSpPr>
               <p:cNvPr id="73" name="TextBox 72">
@@ -12247,6 +12021,7 @@
               </a:bodyPr>
               <a:lstStyle/>
               <a:p>
+                <a:pPr/>
                 <a14:m>
                   <m:oMathPara xmlns:m="http://schemas.openxmlformats.org/officeDocument/2006/math">
                     <m:oMathParaPr>
@@ -12267,7 +12042,7 @@
             </p:txBody>
           </p:sp>
         </mc:Choice>
-        <mc:Fallback>
+        <mc:Fallback xmlns="">
           <p:sp>
             <p:nvSpPr>
               <p:cNvPr id="73" name="TextBox 72">
@@ -12312,8 +12087,8 @@
           </p:sp>
         </mc:Fallback>
       </mc:AlternateContent>
-      <mc:AlternateContent xmlns:mc="http://schemas.openxmlformats.org/markup-compatibility/2006">
-        <mc:Choice xmlns:a14="http://schemas.microsoft.com/office/drawing/2010/main" Requires="a14">
+      <mc:AlternateContent xmlns:mc="http://schemas.openxmlformats.org/markup-compatibility/2006" xmlns:a14="http://schemas.microsoft.com/office/drawing/2010/main">
+        <mc:Choice Requires="a14">
           <p:sp>
             <p:nvSpPr>
               <p:cNvPr id="74" name="TextBox 73">
@@ -12342,6 +12117,7 @@
               </a:bodyPr>
               <a:lstStyle/>
               <a:p>
+                <a:pPr/>
                 <a14:m>
                   <m:oMathPara xmlns:m="http://schemas.openxmlformats.org/officeDocument/2006/math">
                     <m:oMathParaPr>
@@ -12362,7 +12138,7 @@
             </p:txBody>
           </p:sp>
         </mc:Choice>
-        <mc:Fallback>
+        <mc:Fallback xmlns="">
           <p:sp>
             <p:nvSpPr>
               <p:cNvPr id="74" name="TextBox 73">

</xml_diff>

<commit_message>
Create first draft of conference presentation.
For the 31st Space Flight Mechanics conference.
</commit_message>
<xml_diff>
--- a/journal/figures/myFigures.pptx
+++ b/journal/figures/myFigures.pptx
@@ -262,7 +262,7 @@
           <a:p>
             <a:fld id="{2CEF6C36-5691-4952-B197-D88666D142D8}" type="datetimeFigureOut">
               <a:rPr lang="en-US" smtClean="0"/>
-              <a:t>10/27/2020</a:t>
+              <a:t>1/7/2021</a:t>
             </a:fld>
             <a:endParaRPr lang="en-US"/>
           </a:p>
@@ -460,7 +460,7 @@
           <a:p>
             <a:fld id="{2CEF6C36-5691-4952-B197-D88666D142D8}" type="datetimeFigureOut">
               <a:rPr lang="en-US" smtClean="0"/>
-              <a:t>10/27/2020</a:t>
+              <a:t>1/7/2021</a:t>
             </a:fld>
             <a:endParaRPr lang="en-US"/>
           </a:p>
@@ -668,7 +668,7 @@
           <a:p>
             <a:fld id="{2CEF6C36-5691-4952-B197-D88666D142D8}" type="datetimeFigureOut">
               <a:rPr lang="en-US" smtClean="0"/>
-              <a:t>10/27/2020</a:t>
+              <a:t>1/7/2021</a:t>
             </a:fld>
             <a:endParaRPr lang="en-US"/>
           </a:p>
@@ -866,7 +866,7 @@
           <a:p>
             <a:fld id="{2CEF6C36-5691-4952-B197-D88666D142D8}" type="datetimeFigureOut">
               <a:rPr lang="en-US" smtClean="0"/>
-              <a:t>10/27/2020</a:t>
+              <a:t>1/7/2021</a:t>
             </a:fld>
             <a:endParaRPr lang="en-US"/>
           </a:p>
@@ -1141,7 +1141,7 @@
           <a:p>
             <a:fld id="{2CEF6C36-5691-4952-B197-D88666D142D8}" type="datetimeFigureOut">
               <a:rPr lang="en-US" smtClean="0"/>
-              <a:t>10/27/2020</a:t>
+              <a:t>1/7/2021</a:t>
             </a:fld>
             <a:endParaRPr lang="en-US"/>
           </a:p>
@@ -1406,7 +1406,7 @@
           <a:p>
             <a:fld id="{2CEF6C36-5691-4952-B197-D88666D142D8}" type="datetimeFigureOut">
               <a:rPr lang="en-US" smtClean="0"/>
-              <a:t>10/27/2020</a:t>
+              <a:t>1/7/2021</a:t>
             </a:fld>
             <a:endParaRPr lang="en-US"/>
           </a:p>
@@ -1818,7 +1818,7 @@
           <a:p>
             <a:fld id="{2CEF6C36-5691-4952-B197-D88666D142D8}" type="datetimeFigureOut">
               <a:rPr lang="en-US" smtClean="0"/>
-              <a:t>10/27/2020</a:t>
+              <a:t>1/7/2021</a:t>
             </a:fld>
             <a:endParaRPr lang="en-US"/>
           </a:p>
@@ -1959,7 +1959,7 @@
           <a:p>
             <a:fld id="{2CEF6C36-5691-4952-B197-D88666D142D8}" type="datetimeFigureOut">
               <a:rPr lang="en-US" smtClean="0"/>
-              <a:t>10/27/2020</a:t>
+              <a:t>1/7/2021</a:t>
             </a:fld>
             <a:endParaRPr lang="en-US"/>
           </a:p>
@@ -2072,7 +2072,7 @@
           <a:p>
             <a:fld id="{2CEF6C36-5691-4952-B197-D88666D142D8}" type="datetimeFigureOut">
               <a:rPr lang="en-US" smtClean="0"/>
-              <a:t>10/27/2020</a:t>
+              <a:t>1/7/2021</a:t>
             </a:fld>
             <a:endParaRPr lang="en-US"/>
           </a:p>
@@ -2383,7 +2383,7 @@
           <a:p>
             <a:fld id="{2CEF6C36-5691-4952-B197-D88666D142D8}" type="datetimeFigureOut">
               <a:rPr lang="en-US" smtClean="0"/>
-              <a:t>10/27/2020</a:t>
+              <a:t>1/7/2021</a:t>
             </a:fld>
             <a:endParaRPr lang="en-US"/>
           </a:p>
@@ -2671,7 +2671,7 @@
           <a:p>
             <a:fld id="{2CEF6C36-5691-4952-B197-D88666D142D8}" type="datetimeFigureOut">
               <a:rPr lang="en-US" smtClean="0"/>
-              <a:t>10/27/2020</a:t>
+              <a:t>1/7/2021</a:t>
             </a:fld>
             <a:endParaRPr lang="en-US"/>
           </a:p>
@@ -2912,7 +2912,7 @@
           <a:p>
             <a:fld id="{2CEF6C36-5691-4952-B197-D88666D142D8}" type="datetimeFigureOut">
               <a:rPr lang="en-US" smtClean="0"/>
-              <a:t>10/27/2020</a:t>
+              <a:t>1/7/2021</a:t>
             </a:fld>
             <a:endParaRPr lang="en-US"/>
           </a:p>
@@ -7844,84 +7844,6 @@
               <a:latin typeface="Times New Roman" panose="02020603050405020304" pitchFamily="18" charset="0"/>
               <a:cs typeface="Times New Roman" panose="02020603050405020304" pitchFamily="18" charset="0"/>
             </a:endParaRPr>
-          </a:p>
-        </p:txBody>
-      </p:sp>
-      <p:sp>
-        <p:nvSpPr>
-          <p:cNvPr id="42" name="TextBox 41">
-            <a:extLst>
-              <a:ext uri="{FF2B5EF4-FFF2-40B4-BE49-F238E27FC236}">
-                <a16:creationId xmlns:a16="http://schemas.microsoft.com/office/drawing/2014/main" id="{5055AC2F-8664-4A0D-9160-72CEEB37BBEA}"/>
-              </a:ext>
-            </a:extLst>
-          </p:cNvPr>
-          <p:cNvSpPr txBox="1"/>
-          <p:nvPr/>
-        </p:nvSpPr>
-        <p:spPr>
-          <a:xfrm>
-            <a:off x="909412" y="3742462"/>
-            <a:ext cx="1018547" cy="338554"/>
-          </a:xfrm>
-          <a:prstGeom prst="rect">
-            <a:avLst/>
-          </a:prstGeom>
-          <a:noFill/>
-        </p:spPr>
-        <p:txBody>
-          <a:bodyPr wrap="square" rtlCol="0">
-            <a:spAutoFit/>
-          </a:bodyPr>
-          <a:lstStyle/>
-          <a:p>
-            <a:pPr algn="ctr"/>
-            <a:r>
-              <a:rPr lang="en-US" sz="1600" dirty="0">
-                <a:latin typeface="Times New Roman" panose="02020603050405020304" pitchFamily="18" charset="0"/>
-                <a:cs typeface="Times New Roman" panose="02020603050405020304" pitchFamily="18" charset="0"/>
-              </a:rPr>
-              <a:t>CB</a:t>
-            </a:r>
-          </a:p>
-        </p:txBody>
-      </p:sp>
-      <p:sp>
-        <p:nvSpPr>
-          <p:cNvPr id="43" name="TextBox 42">
-            <a:extLst>
-              <a:ext uri="{FF2B5EF4-FFF2-40B4-BE49-F238E27FC236}">
-                <a16:creationId xmlns:a16="http://schemas.microsoft.com/office/drawing/2014/main" id="{90CE0ECE-04CE-4DD8-9726-1D4DBE76C42A}"/>
-              </a:ext>
-            </a:extLst>
-          </p:cNvPr>
-          <p:cNvSpPr txBox="1"/>
-          <p:nvPr/>
-        </p:nvSpPr>
-        <p:spPr>
-          <a:xfrm>
-            <a:off x="7216070" y="4183978"/>
-            <a:ext cx="1018547" cy="338554"/>
-          </a:xfrm>
-          <a:prstGeom prst="rect">
-            <a:avLst/>
-          </a:prstGeom>
-          <a:noFill/>
-        </p:spPr>
-        <p:txBody>
-          <a:bodyPr wrap="square" rtlCol="0">
-            <a:spAutoFit/>
-          </a:bodyPr>
-          <a:lstStyle/>
-          <a:p>
-            <a:pPr algn="ctr"/>
-            <a:r>
-              <a:rPr lang="en-US" sz="1600" dirty="0">
-                <a:latin typeface="Times New Roman" panose="02020603050405020304" pitchFamily="18" charset="0"/>
-                <a:cs typeface="Times New Roman" panose="02020603050405020304" pitchFamily="18" charset="0"/>
-              </a:rPr>
-              <a:t>CB</a:t>
-            </a:r>
           </a:p>
         </p:txBody>
       </p:sp>

</xml_diff>